<commit_message>
add a intro que faltava no ppt
</commit_message>
<xml_diff>
--- a/DataCenter.pptx
+++ b/DataCenter.pptx
@@ -150,7 +150,7 @@
   </p:defaultTextStyle>
   <p:extLst>
     <p:ext uri="{EFAFB233-063F-42B5-8137-9DF3F51BA10A}">
-      <p15:sldGuideLst xmlns:p15="http://schemas.microsoft.com/office/powerpoint/2012/main" xmlns="">
+      <p15:sldGuideLst xmlns:p15="http://schemas.microsoft.com/office/powerpoint/2012/main">
         <p15:guide id="1" orient="horz" pos="2160">
           <p15:clr>
             <a:srgbClr val="A4A3A4"/>
@@ -164,7 +164,7 @@
       </p15:sldGuideLst>
     </p:ext>
     <p:ext uri="{2D200454-40CA-4A62-9FC3-DE9A4176ACB9}">
-      <p15:notesGuideLst xmlns:p15="http://schemas.microsoft.com/office/powerpoint/2012/main" xmlns=""/>
+      <p15:notesGuideLst xmlns:p15="http://schemas.microsoft.com/office/powerpoint/2012/main"/>
     </p:ext>
   </p:extLst>
 </p:presentation>
@@ -273,7 +273,7 @@
     </p:spTree>
     <p:extLst>
       <p:ext uri="{BB962C8B-B14F-4D97-AF65-F5344CB8AC3E}">
-        <p14:creationId xmlns:p14="http://schemas.microsoft.com/office/powerpoint/2010/main" xmlns="" val="1"/>
+        <p14:creationId xmlns:p14="http://schemas.microsoft.com/office/powerpoint/2010/main" val="1"/>
       </p:ext>
     </p:extLst>
   </p:cSld>
@@ -331,14 +331,14 @@
           <a:effectLst/>
           <a:extLst>
             <a:ext uri="{909E8E84-426E-40DD-AFC4-6F175D3DCCD1}">
-              <a14:hiddenFill xmlns:a14="http://schemas.microsoft.com/office/drawing/2010/main" xmlns="">
+              <a14:hiddenFill xmlns:a14="http://schemas.microsoft.com/office/drawing/2010/main">
                 <a:solidFill>
                   <a:schemeClr val="accent1"/>
                 </a:solidFill>
               </a14:hiddenFill>
             </a:ext>
             <a:ext uri="{91240B29-F687-4F45-9708-019B960494DF}">
-              <a14:hiddenLine xmlns:a14="http://schemas.microsoft.com/office/drawing/2010/main" xmlns="" w="9525">
+              <a14:hiddenLine xmlns:a14="http://schemas.microsoft.com/office/drawing/2010/main" w="9525">
                 <a:solidFill>
                   <a:schemeClr val="tx1"/>
                 </a:solidFill>
@@ -348,7 +348,7 @@
               </a14:hiddenLine>
             </a:ext>
             <a:ext uri="{AF507438-7753-43E0-B8FC-AC1667EBCBE1}">
-              <a14:hiddenEffects xmlns:a14="http://schemas.microsoft.com/office/drawing/2010/main" xmlns="">
+              <a14:hiddenEffects xmlns:a14="http://schemas.microsoft.com/office/drawing/2010/main">
                 <a:effectLst>
                   <a:outerShdw dist="35921" dir="2700000" algn="ctr" rotWithShape="0">
                     <a:schemeClr val="bg2"/>
@@ -402,14 +402,14 @@
           <a:effectLst/>
           <a:extLst>
             <a:ext uri="{909E8E84-426E-40DD-AFC4-6F175D3DCCD1}">
-              <a14:hiddenFill xmlns:a14="http://schemas.microsoft.com/office/drawing/2010/main" xmlns="">
+              <a14:hiddenFill xmlns:a14="http://schemas.microsoft.com/office/drawing/2010/main">
                 <a:solidFill>
                   <a:schemeClr val="accent1"/>
                 </a:solidFill>
               </a14:hiddenFill>
             </a:ext>
             <a:ext uri="{91240B29-F687-4F45-9708-019B960494DF}">
-              <a14:hiddenLine xmlns:a14="http://schemas.microsoft.com/office/drawing/2010/main" xmlns="" w="9525">
+              <a14:hiddenLine xmlns:a14="http://schemas.microsoft.com/office/drawing/2010/main" w="9525">
                 <a:solidFill>
                   <a:schemeClr val="tx1"/>
                 </a:solidFill>
@@ -419,7 +419,7 @@
               </a14:hiddenLine>
             </a:ext>
             <a:ext uri="{AF507438-7753-43E0-B8FC-AC1667EBCBE1}">
-              <a14:hiddenEffects xmlns:a14="http://schemas.microsoft.com/office/drawing/2010/main" xmlns="">
+              <a14:hiddenEffects xmlns:a14="http://schemas.microsoft.com/office/drawing/2010/main">
                 <a:effectLst>
                   <a:outerShdw dist="35921" dir="2700000" algn="ctr" rotWithShape="0">
                     <a:schemeClr val="bg2"/>
@@ -503,14 +503,14 @@
           <a:effectLst/>
           <a:extLst>
             <a:ext uri="{909E8E84-426E-40DD-AFC4-6F175D3DCCD1}">
-              <a14:hiddenFill xmlns:a14="http://schemas.microsoft.com/office/drawing/2010/main" xmlns="">
+              <a14:hiddenFill xmlns:a14="http://schemas.microsoft.com/office/drawing/2010/main">
                 <a:solidFill>
                   <a:schemeClr val="accent1"/>
                 </a:solidFill>
               </a14:hiddenFill>
             </a:ext>
             <a:ext uri="{91240B29-F687-4F45-9708-019B960494DF}">
-              <a14:hiddenLine xmlns:a14="http://schemas.microsoft.com/office/drawing/2010/main" xmlns="" w="9525">
+              <a14:hiddenLine xmlns:a14="http://schemas.microsoft.com/office/drawing/2010/main" w="9525">
                 <a:solidFill>
                   <a:schemeClr val="tx1"/>
                 </a:solidFill>
@@ -520,7 +520,7 @@
               </a14:hiddenLine>
             </a:ext>
             <a:ext uri="{AF507438-7753-43E0-B8FC-AC1667EBCBE1}">
-              <a14:hiddenEffects xmlns:a14="http://schemas.microsoft.com/office/drawing/2010/main" xmlns="">
+              <a14:hiddenEffects xmlns:a14="http://schemas.microsoft.com/office/drawing/2010/main">
                 <a:effectLst>
                   <a:outerShdw dist="35921" dir="2700000" algn="ctr" rotWithShape="0">
                     <a:schemeClr val="bg2"/>
@@ -599,14 +599,14 @@
           <a:effectLst/>
           <a:extLst>
             <a:ext uri="{909E8E84-426E-40DD-AFC4-6F175D3DCCD1}">
-              <a14:hiddenFill xmlns:a14="http://schemas.microsoft.com/office/drawing/2010/main" xmlns="">
+              <a14:hiddenFill xmlns:a14="http://schemas.microsoft.com/office/drawing/2010/main">
                 <a:solidFill>
                   <a:schemeClr val="accent1"/>
                 </a:solidFill>
               </a14:hiddenFill>
             </a:ext>
             <a:ext uri="{91240B29-F687-4F45-9708-019B960494DF}">
-              <a14:hiddenLine xmlns:a14="http://schemas.microsoft.com/office/drawing/2010/main" xmlns="" w="9525">
+              <a14:hiddenLine xmlns:a14="http://schemas.microsoft.com/office/drawing/2010/main" w="9525">
                 <a:solidFill>
                   <a:schemeClr val="tx1"/>
                 </a:solidFill>
@@ -616,7 +616,7 @@
               </a14:hiddenLine>
             </a:ext>
             <a:ext uri="{AF507438-7753-43E0-B8FC-AC1667EBCBE1}">
-              <a14:hiddenEffects xmlns:a14="http://schemas.microsoft.com/office/drawing/2010/main" xmlns="">
+              <a14:hiddenEffects xmlns:a14="http://schemas.microsoft.com/office/drawing/2010/main">
                 <a:effectLst>
                   <a:outerShdw dist="35921" dir="2700000" algn="ctr" rotWithShape="0">
                     <a:schemeClr val="bg2"/>
@@ -670,14 +670,14 @@
           <a:effectLst/>
           <a:extLst>
             <a:ext uri="{909E8E84-426E-40DD-AFC4-6F175D3DCCD1}">
-              <a14:hiddenFill xmlns:a14="http://schemas.microsoft.com/office/drawing/2010/main" xmlns="">
+              <a14:hiddenFill xmlns:a14="http://schemas.microsoft.com/office/drawing/2010/main">
                 <a:solidFill>
                   <a:schemeClr val="accent1"/>
                 </a:solidFill>
               </a14:hiddenFill>
             </a:ext>
             <a:ext uri="{91240B29-F687-4F45-9708-019B960494DF}">
-              <a14:hiddenLine xmlns:a14="http://schemas.microsoft.com/office/drawing/2010/main" xmlns="" w="9525">
+              <a14:hiddenLine xmlns:a14="http://schemas.microsoft.com/office/drawing/2010/main" w="9525">
                 <a:solidFill>
                   <a:schemeClr val="tx1"/>
                 </a:solidFill>
@@ -687,7 +687,7 @@
               </a14:hiddenLine>
             </a:ext>
             <a:ext uri="{AF507438-7753-43E0-B8FC-AC1667EBCBE1}">
-              <a14:hiddenEffects xmlns:a14="http://schemas.microsoft.com/office/drawing/2010/main" xmlns="">
+              <a14:hiddenEffects xmlns:a14="http://schemas.microsoft.com/office/drawing/2010/main">
                 <a:effectLst>
                   <a:outerShdw dist="35921" dir="2700000" algn="ctr" rotWithShape="0">
                     <a:schemeClr val="bg2"/>
@@ -1122,7 +1122,7 @@
     </p:spTree>
     <p:extLst>
       <p:ext uri="{BB962C8B-B14F-4D97-AF65-F5344CB8AC3E}">
-        <p14:creationId xmlns:p14="http://schemas.microsoft.com/office/powerpoint/2010/main" xmlns="" val="3807054489"/>
+        <p14:creationId xmlns:p14="http://schemas.microsoft.com/office/powerpoint/2010/main" val="3807054489"/>
       </p:ext>
     </p:extLst>
   </p:cSld>
@@ -1219,7 +1219,7 @@
     </p:spTree>
     <p:extLst>
       <p:ext uri="{BB962C8B-B14F-4D97-AF65-F5344CB8AC3E}">
-        <p14:creationId xmlns:p14="http://schemas.microsoft.com/office/powerpoint/2010/main" xmlns="" val="3750830665"/>
+        <p14:creationId xmlns:p14="http://schemas.microsoft.com/office/powerpoint/2010/main" val="3750830665"/>
       </p:ext>
     </p:extLst>
   </p:cSld>
@@ -1316,7 +1316,7 @@
     </p:spTree>
     <p:extLst>
       <p:ext uri="{BB962C8B-B14F-4D97-AF65-F5344CB8AC3E}">
-        <p14:creationId xmlns:p14="http://schemas.microsoft.com/office/powerpoint/2010/main" xmlns="" val="4179949900"/>
+        <p14:creationId xmlns:p14="http://schemas.microsoft.com/office/powerpoint/2010/main" val="4179949900"/>
       </p:ext>
     </p:extLst>
   </p:cSld>
@@ -1413,7 +1413,7 @@
     </p:spTree>
     <p:extLst>
       <p:ext uri="{BB962C8B-B14F-4D97-AF65-F5344CB8AC3E}">
-        <p14:creationId xmlns:p14="http://schemas.microsoft.com/office/powerpoint/2010/main" xmlns="" val="278944399"/>
+        <p14:creationId xmlns:p14="http://schemas.microsoft.com/office/powerpoint/2010/main" val="278944399"/>
       </p:ext>
     </p:extLst>
   </p:cSld>
@@ -1510,7 +1510,7 @@
     </p:spTree>
     <p:extLst>
       <p:ext uri="{BB962C8B-B14F-4D97-AF65-F5344CB8AC3E}">
-        <p14:creationId xmlns:p14="http://schemas.microsoft.com/office/powerpoint/2010/main" xmlns="" val="340292597"/>
+        <p14:creationId xmlns:p14="http://schemas.microsoft.com/office/powerpoint/2010/main" val="340292597"/>
       </p:ext>
     </p:extLst>
   </p:cSld>
@@ -1699,7 +1699,7 @@
     </p:spTree>
     <p:extLst>
       <p:ext uri="{BB962C8B-B14F-4D97-AF65-F5344CB8AC3E}">
-        <p14:creationId xmlns:p14="http://schemas.microsoft.com/office/powerpoint/2010/main" xmlns="" val="293590396"/>
+        <p14:creationId xmlns:p14="http://schemas.microsoft.com/office/powerpoint/2010/main" val="293590396"/>
       </p:ext>
     </p:extLst>
   </p:cSld>
@@ -1788,7 +1788,7 @@
           </a:xfrm>
           <a:extLst>
             <a:ext uri="{AF507438-7753-43E0-B8FC-AC1667EBCBE1}">
-              <a14:hiddenEffects xmlns:a14="http://schemas.microsoft.com/office/drawing/2010/main" xmlns="">
+              <a14:hiddenEffects xmlns:a14="http://schemas.microsoft.com/office/drawing/2010/main">
                 <a:effectLst>
                   <a:outerShdw dist="17961" dir="2700000" algn="ctr" rotWithShape="0">
                     <a:schemeClr val="bg2"/>
@@ -3889,12 +3889,12 @@
         </p:nvSpPr>
         <p:spPr>
           <a:xfrm>
-            <a:off x="0" y="3068961"/>
-            <a:ext cx="3598863" cy="563239"/>
+            <a:off x="1" y="3068961"/>
+            <a:ext cx="2123727" cy="563239"/>
           </a:xfrm>
           <a:extLst>
             <a:ext uri="{AF507438-7753-43E0-B8FC-AC1667EBCBE1}">
-              <a14:hiddenEffects xmlns:a14="http://schemas.microsoft.com/office/drawing/2010/main" xmlns="">
+              <a14:hiddenEffects xmlns:a14="http://schemas.microsoft.com/office/drawing/2010/main">
                 <a:effectLst>
                   <a:outerShdw dist="17961" dir="2700000" algn="ctr" rotWithShape="0">
                     <a:schemeClr val="bg2"/>
@@ -3912,8 +3912,8 @@
               <a:lnSpc>
                 <a:spcPct val="90000"/>
               </a:lnSpc>
-              <a:buFont typeface="+mj-lt"/>
-              <a:buAutoNum type="arabicPeriod"/>
+              <a:buFont typeface="Arial" panose="020B0604020202020204" pitchFamily="34" charset="0"/>
+              <a:buChar char="•"/>
               <a:defRPr/>
             </a:pPr>
             <a:r>
@@ -3928,8 +3928,8 @@
               <a:lnSpc>
                 <a:spcPct val="90000"/>
               </a:lnSpc>
-              <a:buFont typeface="+mj-lt"/>
-              <a:buAutoNum type="arabicPeriod"/>
+              <a:buFont typeface="Arial" panose="020B0604020202020204" pitchFamily="34" charset="0"/>
+              <a:buChar char="•"/>
               <a:defRPr/>
             </a:pPr>
             <a:r>
@@ -3944,8 +3944,8 @@
               <a:lnSpc>
                 <a:spcPct val="90000"/>
               </a:lnSpc>
-              <a:buFont typeface="+mj-lt"/>
-              <a:buAutoNum type="arabicPeriod"/>
+              <a:buFont typeface="Arial" panose="020B0604020202020204" pitchFamily="34" charset="0"/>
+              <a:buChar char="•"/>
               <a:defRPr/>
             </a:pPr>
             <a:r>
@@ -3960,8 +3960,8 @@
               <a:lnSpc>
                 <a:spcPct val="90000"/>
               </a:lnSpc>
-              <a:buFont typeface="+mj-lt"/>
-              <a:buAutoNum type="arabicPeriod"/>
+              <a:buFont typeface="Arial" panose="020B0604020202020204" pitchFamily="34" charset="0"/>
+              <a:buChar char="•"/>
               <a:defRPr/>
             </a:pPr>
             <a:r>
@@ -3981,6 +3981,84 @@
             <a:endParaRPr lang="uk-UA" sz="2000" dirty="0">
               <a:latin typeface="+mj-lt"/>
             </a:endParaRPr>
+          </a:p>
+        </p:txBody>
+      </p:sp>
+      <p:sp>
+        <p:nvSpPr>
+          <p:cNvPr id="2" name="CaixaDeTexto 1">
+            <a:extLst>
+              <a:ext uri="{FF2B5EF4-FFF2-40B4-BE49-F238E27FC236}">
+                <a16:creationId xmlns:a16="http://schemas.microsoft.com/office/drawing/2014/main" id="{B475BB1C-34E4-4CC5-9E48-EE93BA37743C}"/>
+              </a:ext>
+            </a:extLst>
+          </p:cNvPr>
+          <p:cNvSpPr txBox="1"/>
+          <p:nvPr/>
+        </p:nvSpPr>
+        <p:spPr>
+          <a:xfrm>
+            <a:off x="2051721" y="2975996"/>
+            <a:ext cx="2213788" cy="1600438"/>
+          </a:xfrm>
+          <a:prstGeom prst="rect">
+            <a:avLst/>
+          </a:prstGeom>
+          <a:noFill/>
+        </p:spPr>
+        <p:txBody>
+          <a:bodyPr wrap="square" rtlCol="0">
+            <a:spAutoFit/>
+          </a:bodyPr>
+          <a:lstStyle/>
+          <a:p>
+            <a:pPr marL="342900" indent="-342900">
+              <a:buFont typeface="Arial" panose="020B0604020202020204" pitchFamily="34" charset="0"/>
+              <a:buChar char="•"/>
+            </a:pPr>
+            <a:r>
+              <a:rPr lang="pt-BR" sz="2000" b="1" dirty="0">
+                <a:solidFill>
+                  <a:schemeClr val="bg1"/>
+                </a:solidFill>
+              </a:rPr>
+              <a:t>Nosso Projeto</a:t>
+            </a:r>
+          </a:p>
+          <a:p>
+            <a:pPr marL="342900" indent="-342900">
+              <a:buFont typeface="Arial" panose="020B0604020202020204" pitchFamily="34" charset="0"/>
+              <a:buChar char="•"/>
+            </a:pPr>
+            <a:r>
+              <a:rPr lang="pt-BR" sz="2000" b="1" dirty="0">
+                <a:solidFill>
+                  <a:schemeClr val="bg1"/>
+                </a:solidFill>
+              </a:rPr>
+              <a:t>Requisitos</a:t>
+            </a:r>
+          </a:p>
+          <a:p>
+            <a:pPr marL="342900" indent="-342900">
+              <a:buFont typeface="Arial" panose="020B0604020202020204" pitchFamily="34" charset="0"/>
+              <a:buChar char="•"/>
+            </a:pPr>
+            <a:r>
+              <a:rPr lang="pt-BR" sz="2000" b="1" dirty="0">
+                <a:solidFill>
+                  <a:schemeClr val="bg1"/>
+                </a:solidFill>
+              </a:rPr>
+              <a:t>Processos</a:t>
+            </a:r>
+          </a:p>
+          <a:p>
+            <a:pPr marL="342900" indent="-342900">
+              <a:buFont typeface="Arial" panose="020B0604020202020204" pitchFamily="34" charset="0"/>
+              <a:buChar char="•"/>
+            </a:pPr>
+            <a:endParaRPr lang="pt-BR" dirty="0"/>
           </a:p>
         </p:txBody>
       </p:sp>
@@ -4382,7 +4460,7 @@
     </p:spTree>
     <p:extLst>
       <p:ext uri="{BB962C8B-B14F-4D97-AF65-F5344CB8AC3E}">
-        <p14:creationId xmlns:p14="http://schemas.microsoft.com/office/powerpoint/2010/main" xmlns="" val="3594642026"/>
+        <p14:creationId xmlns:p14="http://schemas.microsoft.com/office/powerpoint/2010/main" val="3594642026"/>
       </p:ext>
     </p:extLst>
   </p:cSld>
@@ -4489,26 +4567,10 @@
                 <a:ea typeface="굴림" charset="-127"/>
                 <a:cs typeface="Calibri" panose="020F0502020204030204" pitchFamily="34" charset="0"/>
               </a:rPr>
-              <a:t>Um estudo informa que os servidores de um Data Center gastam, em média, 850 watts por hora. </a:t>
-            </a:r>
-            <a:r>
-              <a:rPr lang="pt-BR" altLang="ko-KR" sz="2000" dirty="0" smtClean="0">
-                <a:latin typeface="Calibri" panose="020F0502020204030204" pitchFamily="34" charset="0"/>
-                <a:ea typeface="굴림" charset="-127"/>
-                <a:cs typeface="Calibri" panose="020F0502020204030204" pitchFamily="34" charset="0"/>
-              </a:rPr>
-              <a:t>Multiplicado </a:t>
-            </a:r>
-            <a:r>
-              <a:rPr lang="pt-BR" altLang="ko-KR" sz="2000" dirty="0" smtClean="0">
-                <a:latin typeface="Calibri" panose="020F0502020204030204" pitchFamily="34" charset="0"/>
-                <a:ea typeface="굴림" charset="-127"/>
-                <a:cs typeface="Calibri" panose="020F0502020204030204" pitchFamily="34" charset="0"/>
-              </a:rPr>
-              <a:t>por 24 equivale a 20.400 watts diários, ou 20.4 </a:t>
-            </a:r>
-            <a:r>
-              <a:rPr lang="pt-BR" altLang="ko-KR" sz="2000" dirty="0" err="1" smtClean="0">
+              <a:t>Um estudo informa que os servidores de um Data Center gastam, em média, 850 watts por hora. Multiplicado por 24 equivale a 20.400 watts diários, ou 20.4 </a:t>
+            </a:r>
+            <a:r>
+              <a:rPr lang="pt-BR" altLang="ko-KR" sz="2000" dirty="0" err="1">
                 <a:latin typeface="Calibri" panose="020F0502020204030204" pitchFamily="34" charset="0"/>
                 <a:ea typeface="굴림" charset="-127"/>
                 <a:cs typeface="Calibri" panose="020F0502020204030204" pitchFamily="34" charset="0"/>
@@ -4516,7 +4578,7 @@
               <a:t>kilowatts</a:t>
             </a:r>
             <a:r>
-              <a:rPr lang="pt-BR" altLang="ko-KR" sz="2000" dirty="0" smtClean="0">
+              <a:rPr lang="pt-BR" altLang="ko-KR" sz="2000" dirty="0">
                 <a:latin typeface="Calibri" panose="020F0502020204030204" pitchFamily="34" charset="0"/>
                 <a:ea typeface="굴림" charset="-127"/>
                 <a:cs typeface="Calibri" panose="020F0502020204030204" pitchFamily="34" charset="0"/>
@@ -4524,7 +4586,7 @@
               <a:t> (kWh). Multiplique isso por 30 dias para chegar a 612 kWh mensais. Sabendo-se que um </a:t>
             </a:r>
             <a:r>
-              <a:rPr lang="pt-BR" altLang="ko-KR" sz="2000" dirty="0" err="1" smtClean="0">
+              <a:rPr lang="pt-BR" altLang="ko-KR" sz="2000" dirty="0" err="1">
                 <a:latin typeface="Calibri" panose="020F0502020204030204" pitchFamily="34" charset="0"/>
                 <a:ea typeface="굴림" charset="-127"/>
                 <a:cs typeface="Calibri" panose="020F0502020204030204" pitchFamily="34" charset="0"/>
@@ -4532,20 +4594,12 @@
               <a:t>kwh</a:t>
             </a:r>
             <a:r>
-              <a:rPr lang="pt-BR" altLang="ko-KR" sz="2000" dirty="0" smtClean="0">
+              <a:rPr lang="pt-BR" altLang="ko-KR" sz="2000" dirty="0">
                 <a:latin typeface="Calibri" panose="020F0502020204030204" pitchFamily="34" charset="0"/>
                 <a:ea typeface="굴림" charset="-127"/>
                 <a:cs typeface="Calibri" panose="020F0502020204030204" pitchFamily="34" charset="0"/>
               </a:rPr>
-              <a:t>  é igual a R$ 0,80 em tarifa comercial na região de São Paulo o valor de uma conta seria de R$ 489,60</a:t>
-            </a:r>
-            <a:r>
-              <a:rPr lang="pt-BR" altLang="ko-KR" sz="2000" dirty="0" smtClean="0">
-                <a:latin typeface="Calibri" panose="020F0502020204030204" pitchFamily="34" charset="0"/>
-                <a:ea typeface="굴림" charset="-127"/>
-                <a:cs typeface="Calibri" panose="020F0502020204030204" pitchFamily="34" charset="0"/>
-              </a:rPr>
-              <a:t>.</a:t>
+              <a:t>  é igual a R$ 0,80 em tarifa comercial na região de São Paulo o valor de uma conta seria de R$ 489,60.</a:t>
             </a:r>
           </a:p>
           <a:p>
@@ -4555,7 +4609,7 @@
               </a:lnSpc>
               <a:defRPr/>
             </a:pPr>
-            <a:endParaRPr lang="pt-BR" altLang="ko-KR" sz="2000" dirty="0" smtClean="0">
+            <a:endParaRPr lang="pt-BR" altLang="ko-KR" sz="2000" dirty="0">
               <a:latin typeface="Calibri" panose="020F0502020204030204" pitchFamily="34" charset="0"/>
               <a:ea typeface="굴림" charset="-127"/>
               <a:cs typeface="Calibri" panose="020F0502020204030204" pitchFamily="34" charset="0"/>
@@ -4569,23 +4623,15 @@
               <a:defRPr/>
             </a:pPr>
             <a:r>
-              <a:rPr lang="pt-BR" altLang="ko-KR" sz="2000" dirty="0" smtClean="0">
+              <a:rPr lang="pt-BR" altLang="ko-KR" sz="2000" dirty="0">
                 <a:latin typeface="Calibri" panose="020F0502020204030204" pitchFamily="34" charset="0"/>
                 <a:ea typeface="굴림" charset="-127"/>
                 <a:cs typeface="Calibri" panose="020F0502020204030204" pitchFamily="34" charset="0"/>
               </a:rPr>
-              <a:t> </a:t>
-            </a:r>
-            <a:r>
-              <a:rPr lang="pt-BR" altLang="ko-KR" sz="2000" dirty="0" smtClean="0">
-                <a:latin typeface="Calibri" panose="020F0502020204030204" pitchFamily="34" charset="0"/>
-                <a:ea typeface="굴림" charset="-127"/>
-                <a:cs typeface="Calibri" panose="020F0502020204030204" pitchFamily="34" charset="0"/>
-              </a:rPr>
-              <a:t>Um aparelho de ar condicionado com uma potência de 1.580 Watts hora (a potência média de referência) multiplicado por 24 equivale a 37.920 watts diários, ou 37.9 </a:t>
-            </a:r>
-            <a:r>
-              <a:rPr lang="pt-BR" altLang="ko-KR" sz="2000" dirty="0" err="1" smtClean="0">
+              <a:t> Um aparelho de ar condicionado com uma potência de 1.580 Watts hora (a potência média de referência) multiplicado por 24 equivale a 37.920 watts diários, ou 37.9 </a:t>
+            </a:r>
+            <a:r>
+              <a:rPr lang="pt-BR" altLang="ko-KR" sz="2000" dirty="0" err="1">
                 <a:latin typeface="Calibri" panose="020F0502020204030204" pitchFamily="34" charset="0"/>
                 <a:ea typeface="굴림" charset="-127"/>
                 <a:cs typeface="Calibri" panose="020F0502020204030204" pitchFamily="34" charset="0"/>
@@ -4593,18 +4639,13 @@
               <a:t>kilowatts</a:t>
             </a:r>
             <a:r>
-              <a:rPr lang="pt-BR" altLang="ko-KR" sz="2000" dirty="0" smtClean="0">
+              <a:rPr lang="pt-BR" altLang="ko-KR" sz="2000" dirty="0">
                 <a:latin typeface="Calibri" panose="020F0502020204030204" pitchFamily="34" charset="0"/>
                 <a:ea typeface="굴림" charset="-127"/>
                 <a:cs typeface="Calibri" panose="020F0502020204030204" pitchFamily="34" charset="0"/>
               </a:rPr>
               <a:t> (kWh). Multiplique isso por 30 dias para chegar a 1137 kWh mensais o total seria de R$ 909,60 por mês. </a:t>
             </a:r>
-            <a:endParaRPr lang="pt-BR" altLang="ko-KR" sz="2000" dirty="0" smtClean="0">
-              <a:latin typeface="Calibri" panose="020F0502020204030204" pitchFamily="34" charset="0"/>
-              <a:ea typeface="굴림" charset="-127"/>
-              <a:cs typeface="Calibri" panose="020F0502020204030204" pitchFamily="34" charset="0"/>
-            </a:endParaRPr>
           </a:p>
           <a:p>
             <a:pPr eaLnBrk="1" hangingPunct="1">
@@ -4613,7 +4654,7 @@
               </a:lnSpc>
               <a:defRPr/>
             </a:pPr>
-            <a:endParaRPr lang="pt-BR" altLang="ko-KR" sz="2000" smtClean="0">
+            <a:endParaRPr lang="pt-BR" altLang="ko-KR" sz="2000">
               <a:latin typeface="Calibri" panose="020F0502020204030204" pitchFamily="34" charset="0"/>
               <a:ea typeface="굴림" charset="-127"/>
               <a:cs typeface="Calibri" panose="020F0502020204030204" pitchFamily="34" charset="0"/>
@@ -4627,7 +4668,7 @@
               <a:defRPr/>
             </a:pPr>
             <a:r>
-              <a:rPr lang="pt-BR" altLang="ko-KR" sz="2000" smtClean="0">
+              <a:rPr lang="pt-BR" altLang="ko-KR" sz="2000">
                 <a:latin typeface="Calibri" panose="020F0502020204030204" pitchFamily="34" charset="0"/>
                 <a:ea typeface="굴림" charset="-127"/>
                 <a:cs typeface="Calibri" panose="020F0502020204030204" pitchFamily="34" charset="0"/>
@@ -4635,25 +4676,20 @@
               <a:t>Então </a:t>
             </a:r>
             <a:r>
-              <a:rPr lang="pt-BR" altLang="ko-KR" sz="2000" dirty="0" smtClean="0">
+              <a:rPr lang="pt-BR" altLang="ko-KR" sz="2000" dirty="0">
                 <a:latin typeface="Calibri" panose="020F0502020204030204" pitchFamily="34" charset="0"/>
                 <a:ea typeface="굴림" charset="-127"/>
                 <a:cs typeface="Calibri" panose="020F0502020204030204" pitchFamily="34" charset="0"/>
               </a:rPr>
               <a:t>ao todo apenas na região onde está o data Center (considerando apenas o data Center e o ar condicionado) seria um total de aproximadamente R$ 1400,00.</a:t>
             </a:r>
-            <a:endParaRPr lang="pt-BR" altLang="ko-KR" sz="2000" dirty="0">
-              <a:latin typeface="Calibri" panose="020F0502020204030204" pitchFamily="34" charset="0"/>
-              <a:ea typeface="굴림" charset="-127"/>
-              <a:cs typeface="Calibri" panose="020F0502020204030204" pitchFamily="34" charset="0"/>
-            </a:endParaRPr>
           </a:p>
         </p:txBody>
       </p:sp>
     </p:spTree>
     <p:extLst>
       <p:ext uri="{BB962C8B-B14F-4D97-AF65-F5344CB8AC3E}">
-        <p14:creationId xmlns:p14="http://schemas.microsoft.com/office/powerpoint/2010/main" xmlns="" val="2693028972"/>
+        <p14:creationId xmlns:p14="http://schemas.microsoft.com/office/powerpoint/2010/main" val="2693028972"/>
       </p:ext>
     </p:extLst>
   </p:cSld>
@@ -4897,7 +4933,7 @@
     </p:spTree>
     <p:extLst>
       <p:ext uri="{BB962C8B-B14F-4D97-AF65-F5344CB8AC3E}">
-        <p14:creationId xmlns:p14="http://schemas.microsoft.com/office/powerpoint/2010/main" xmlns="" val="2630225589"/>
+        <p14:creationId xmlns:p14="http://schemas.microsoft.com/office/powerpoint/2010/main" val="2630225589"/>
       </p:ext>
     </p:extLst>
   </p:cSld>
@@ -5131,7 +5167,7 @@
     </p:spTree>
     <p:extLst>
       <p:ext uri="{BB962C8B-B14F-4D97-AF65-F5344CB8AC3E}">
-        <p14:creationId xmlns:p14="http://schemas.microsoft.com/office/powerpoint/2010/main" xmlns="" val="3896836353"/>
+        <p14:creationId xmlns:p14="http://schemas.microsoft.com/office/powerpoint/2010/main" val="3896836353"/>
       </p:ext>
     </p:extLst>
   </p:cSld>
@@ -5405,7 +5441,7 @@
     </p:spTree>
     <p:extLst>
       <p:ext uri="{BB962C8B-B14F-4D97-AF65-F5344CB8AC3E}">
-        <p14:creationId xmlns:p14="http://schemas.microsoft.com/office/powerpoint/2010/main" xmlns="" val="3600870286"/>
+        <p14:creationId xmlns:p14="http://schemas.microsoft.com/office/powerpoint/2010/main" val="3600870286"/>
       </p:ext>
     </p:extLst>
   </p:cSld>
@@ -5490,7 +5526,7 @@
           <p:cNvPr id="3" name="Imagem 2" descr="Uma imagem contendo computer, computador, monitor, tela&#10;&#10;Descrição gerada automaticamente">
             <a:extLst>
               <a:ext uri="{FF2B5EF4-FFF2-40B4-BE49-F238E27FC236}">
-                <a16:creationId xmlns:a16="http://schemas.microsoft.com/office/drawing/2014/main" xmlns="" id="{726C0F36-B66E-4B87-8A4F-95563948DACE}"/>
+                <a16:creationId xmlns:a16="http://schemas.microsoft.com/office/drawing/2014/main" id="{726C0F36-B66E-4B87-8A4F-95563948DACE}"/>
               </a:ext>
             </a:extLst>
           </p:cNvPr>
@@ -5503,7 +5539,7 @@
           <a:blip r:embed="rId4">
             <a:extLst>
               <a:ext uri="{28A0092B-C50C-407E-A947-70E740481C1C}">
-                <a14:useLocalDpi xmlns:a14="http://schemas.microsoft.com/office/drawing/2010/main" xmlns="" val="0"/>
+                <a14:useLocalDpi xmlns:a14="http://schemas.microsoft.com/office/drawing/2010/main" val="0"/>
               </a:ext>
             </a:extLst>
           </a:blip>
@@ -5694,7 +5730,7 @@
     </p:spTree>
     <p:extLst>
       <p:ext uri="{BB962C8B-B14F-4D97-AF65-F5344CB8AC3E}">
-        <p14:creationId xmlns:p14="http://schemas.microsoft.com/office/powerpoint/2010/main" xmlns="" val="654823255"/>
+        <p14:creationId xmlns:p14="http://schemas.microsoft.com/office/powerpoint/2010/main" val="654823255"/>
       </p:ext>
     </p:extLst>
   </p:cSld>
@@ -6380,7 +6416,7 @@
   </a:extraClrSchemeLst>
   <a:extLst>
     <a:ext uri="{05A4C25C-085E-4340-85A3-A5531E510DB2}">
-      <thm15:themeFamily xmlns:thm15="http://schemas.microsoft.com/office/thememl/2012/main" xmlns="" name="template.potx" id="{9AD1E770-F34A-4B83-98BE-BCB4E1CA2A38}" vid="{F423FF84-1499-40C4-95D0-00FFD65AB022}"/>
+      <thm15:themeFamily xmlns:thm15="http://schemas.microsoft.com/office/thememl/2012/main" name="template.potx" id="{9AD1E770-F34A-4B83-98BE-BCB4E1CA2A38}" vid="{F423FF84-1499-40C4-95D0-00FFD65AB022}"/>
     </a:ext>
   </a:extLst>
 </a:theme>

</xml_diff>

<commit_message>
criei as pastas e modifiquei o sobre do site
</commit_message>
<xml_diff>
--- a/DataCenter.pptx
+++ b/DataCenter.pptx
@@ -150,7 +150,7 @@
   </p:defaultTextStyle>
   <p:extLst>
     <p:ext uri="{EFAFB233-063F-42B5-8137-9DF3F51BA10A}">
-      <p15:sldGuideLst xmlns:p15="http://schemas.microsoft.com/office/powerpoint/2012/main" xmlns="">
+      <p15:sldGuideLst xmlns:p15="http://schemas.microsoft.com/office/powerpoint/2012/main">
         <p15:guide id="1" orient="horz" pos="2160">
           <p15:clr>
             <a:srgbClr val="A4A3A4"/>
@@ -164,18 +164,10 @@
       </p15:sldGuideLst>
     </p:ext>
     <p:ext uri="{2D200454-40CA-4A62-9FC3-DE9A4176ACB9}">
-      <p15:notesGuideLst xmlns:p15="http://schemas.microsoft.com/office/powerpoint/2012/main" xmlns=""/>
+      <p15:notesGuideLst xmlns:p15="http://schemas.microsoft.com/office/powerpoint/2012/main"/>
     </p:ext>
   </p:extLst>
 </p:presentation>
-</file>
-
-<file path=ppt/revisionInfo.xml><?xml version="1.0" encoding="utf-8"?>
-<p1510:revInfo xmlns:a="http://schemas.openxmlformats.org/drawingml/2006/main" xmlns:r="http://schemas.openxmlformats.org/officeDocument/2006/relationships" xmlns:p1510="http://schemas.microsoft.com/office/powerpoint/2015/10/main">
-  <p1510:revLst>
-    <p1510:client id="{F65D147B-9B84-41CA-AE70-80BE3EC8AFFF}" v="1" dt="2020-09-15T19:32:23.665"/>
-  </p1510:revLst>
-</p1510:revInfo>
 </file>
 
 <file path=ppt/changesInfos/changesInfo1.xml><?xml version="1.0" encoding="utf-8"?>
@@ -242,6 +234,30 @@
       </pc:sldChg>
     </pc:docChg>
   </pc:docChgLst>
+  <pc:docChgLst>
+    <pc:chgData name="pedro gimenez miranda silva" userId="a4d8695ce2d52cc0" providerId="LiveId" clId="{CC7057D0-1C77-43DB-9C6F-8BCADDADF172}"/>
+    <pc:docChg chg="modSld">
+      <pc:chgData name="pedro gimenez miranda silva" userId="a4d8695ce2d52cc0" providerId="LiveId" clId="{CC7057D0-1C77-43DB-9C6F-8BCADDADF172}" dt="2020-09-20T21:14:16.383" v="18" actId="20577"/>
+      <pc:docMkLst>
+        <pc:docMk/>
+      </pc:docMkLst>
+      <pc:sldChg chg="modSp mod">
+        <pc:chgData name="pedro gimenez miranda silva" userId="a4d8695ce2d52cc0" providerId="LiveId" clId="{CC7057D0-1C77-43DB-9C6F-8BCADDADF172}" dt="2020-09-20T21:14:16.383" v="18" actId="20577"/>
+        <pc:sldMkLst>
+          <pc:docMk/>
+          <pc:sldMk cId="2630225589" sldId="262"/>
+        </pc:sldMkLst>
+        <pc:spChg chg="mod">
+          <ac:chgData name="pedro gimenez miranda silva" userId="a4d8695ce2d52cc0" providerId="LiveId" clId="{CC7057D0-1C77-43DB-9C6F-8BCADDADF172}" dt="2020-09-20T21:14:16.383" v="18" actId="20577"/>
+          <ac:spMkLst>
+            <pc:docMk/>
+            <pc:sldMk cId="2630225589" sldId="262"/>
+            <ac:spMk id="36867" creationId="{00000000-0000-0000-0000-000000000000}"/>
+          </ac:spMkLst>
+        </pc:spChg>
+      </pc:sldChg>
+    </pc:docChg>
+  </pc:docChgLst>
 </pc:chgInfo>
 </file>
 
@@ -273,7 +289,7 @@
     </p:spTree>
     <p:extLst>
       <p:ext uri="{BB962C8B-B14F-4D97-AF65-F5344CB8AC3E}">
-        <p14:creationId xmlns:p14="http://schemas.microsoft.com/office/powerpoint/2010/main" xmlns="" val="1"/>
+        <p14:creationId xmlns:p14="http://schemas.microsoft.com/office/powerpoint/2010/main" val="1"/>
       </p:ext>
     </p:extLst>
   </p:cSld>
@@ -331,14 +347,14 @@
           <a:effectLst/>
           <a:extLst>
             <a:ext uri="{909E8E84-426E-40DD-AFC4-6F175D3DCCD1}">
-              <a14:hiddenFill xmlns:a14="http://schemas.microsoft.com/office/drawing/2010/main" xmlns="">
+              <a14:hiddenFill xmlns:a14="http://schemas.microsoft.com/office/drawing/2010/main">
                 <a:solidFill>
                   <a:schemeClr val="accent1"/>
                 </a:solidFill>
               </a14:hiddenFill>
             </a:ext>
             <a:ext uri="{91240B29-F687-4F45-9708-019B960494DF}">
-              <a14:hiddenLine xmlns:a14="http://schemas.microsoft.com/office/drawing/2010/main" xmlns="" w="9525">
+              <a14:hiddenLine xmlns:a14="http://schemas.microsoft.com/office/drawing/2010/main" w="9525">
                 <a:solidFill>
                   <a:schemeClr val="tx1"/>
                 </a:solidFill>
@@ -348,7 +364,7 @@
               </a14:hiddenLine>
             </a:ext>
             <a:ext uri="{AF507438-7753-43E0-B8FC-AC1667EBCBE1}">
-              <a14:hiddenEffects xmlns:a14="http://schemas.microsoft.com/office/drawing/2010/main" xmlns="">
+              <a14:hiddenEffects xmlns:a14="http://schemas.microsoft.com/office/drawing/2010/main">
                 <a:effectLst>
                   <a:outerShdw dist="35921" dir="2700000" algn="ctr" rotWithShape="0">
                     <a:schemeClr val="bg2"/>
@@ -402,14 +418,14 @@
           <a:effectLst/>
           <a:extLst>
             <a:ext uri="{909E8E84-426E-40DD-AFC4-6F175D3DCCD1}">
-              <a14:hiddenFill xmlns:a14="http://schemas.microsoft.com/office/drawing/2010/main" xmlns="">
+              <a14:hiddenFill xmlns:a14="http://schemas.microsoft.com/office/drawing/2010/main">
                 <a:solidFill>
                   <a:schemeClr val="accent1"/>
                 </a:solidFill>
               </a14:hiddenFill>
             </a:ext>
             <a:ext uri="{91240B29-F687-4F45-9708-019B960494DF}">
-              <a14:hiddenLine xmlns:a14="http://schemas.microsoft.com/office/drawing/2010/main" xmlns="" w="9525">
+              <a14:hiddenLine xmlns:a14="http://schemas.microsoft.com/office/drawing/2010/main" w="9525">
                 <a:solidFill>
                   <a:schemeClr val="tx1"/>
                 </a:solidFill>
@@ -419,7 +435,7 @@
               </a14:hiddenLine>
             </a:ext>
             <a:ext uri="{AF507438-7753-43E0-B8FC-AC1667EBCBE1}">
-              <a14:hiddenEffects xmlns:a14="http://schemas.microsoft.com/office/drawing/2010/main" xmlns="">
+              <a14:hiddenEffects xmlns:a14="http://schemas.microsoft.com/office/drawing/2010/main">
                 <a:effectLst>
                   <a:outerShdw dist="35921" dir="2700000" algn="ctr" rotWithShape="0">
                     <a:schemeClr val="bg2"/>
@@ -503,14 +519,14 @@
           <a:effectLst/>
           <a:extLst>
             <a:ext uri="{909E8E84-426E-40DD-AFC4-6F175D3DCCD1}">
-              <a14:hiddenFill xmlns:a14="http://schemas.microsoft.com/office/drawing/2010/main" xmlns="">
+              <a14:hiddenFill xmlns:a14="http://schemas.microsoft.com/office/drawing/2010/main">
                 <a:solidFill>
                   <a:schemeClr val="accent1"/>
                 </a:solidFill>
               </a14:hiddenFill>
             </a:ext>
             <a:ext uri="{91240B29-F687-4F45-9708-019B960494DF}">
-              <a14:hiddenLine xmlns:a14="http://schemas.microsoft.com/office/drawing/2010/main" xmlns="" w="9525">
+              <a14:hiddenLine xmlns:a14="http://schemas.microsoft.com/office/drawing/2010/main" w="9525">
                 <a:solidFill>
                   <a:schemeClr val="tx1"/>
                 </a:solidFill>
@@ -520,7 +536,7 @@
               </a14:hiddenLine>
             </a:ext>
             <a:ext uri="{AF507438-7753-43E0-B8FC-AC1667EBCBE1}">
-              <a14:hiddenEffects xmlns:a14="http://schemas.microsoft.com/office/drawing/2010/main" xmlns="">
+              <a14:hiddenEffects xmlns:a14="http://schemas.microsoft.com/office/drawing/2010/main">
                 <a:effectLst>
                   <a:outerShdw dist="35921" dir="2700000" algn="ctr" rotWithShape="0">
                     <a:schemeClr val="bg2"/>
@@ -599,14 +615,14 @@
           <a:effectLst/>
           <a:extLst>
             <a:ext uri="{909E8E84-426E-40DD-AFC4-6F175D3DCCD1}">
-              <a14:hiddenFill xmlns:a14="http://schemas.microsoft.com/office/drawing/2010/main" xmlns="">
+              <a14:hiddenFill xmlns:a14="http://schemas.microsoft.com/office/drawing/2010/main">
                 <a:solidFill>
                   <a:schemeClr val="accent1"/>
                 </a:solidFill>
               </a14:hiddenFill>
             </a:ext>
             <a:ext uri="{91240B29-F687-4F45-9708-019B960494DF}">
-              <a14:hiddenLine xmlns:a14="http://schemas.microsoft.com/office/drawing/2010/main" xmlns="" w="9525">
+              <a14:hiddenLine xmlns:a14="http://schemas.microsoft.com/office/drawing/2010/main" w="9525">
                 <a:solidFill>
                   <a:schemeClr val="tx1"/>
                 </a:solidFill>
@@ -616,7 +632,7 @@
               </a14:hiddenLine>
             </a:ext>
             <a:ext uri="{AF507438-7753-43E0-B8FC-AC1667EBCBE1}">
-              <a14:hiddenEffects xmlns:a14="http://schemas.microsoft.com/office/drawing/2010/main" xmlns="">
+              <a14:hiddenEffects xmlns:a14="http://schemas.microsoft.com/office/drawing/2010/main">
                 <a:effectLst>
                   <a:outerShdw dist="35921" dir="2700000" algn="ctr" rotWithShape="0">
                     <a:schemeClr val="bg2"/>
@@ -670,14 +686,14 @@
           <a:effectLst/>
           <a:extLst>
             <a:ext uri="{909E8E84-426E-40DD-AFC4-6F175D3DCCD1}">
-              <a14:hiddenFill xmlns:a14="http://schemas.microsoft.com/office/drawing/2010/main" xmlns="">
+              <a14:hiddenFill xmlns:a14="http://schemas.microsoft.com/office/drawing/2010/main">
                 <a:solidFill>
                   <a:schemeClr val="accent1"/>
                 </a:solidFill>
               </a14:hiddenFill>
             </a:ext>
             <a:ext uri="{91240B29-F687-4F45-9708-019B960494DF}">
-              <a14:hiddenLine xmlns:a14="http://schemas.microsoft.com/office/drawing/2010/main" xmlns="" w="9525">
+              <a14:hiddenLine xmlns:a14="http://schemas.microsoft.com/office/drawing/2010/main" w="9525">
                 <a:solidFill>
                   <a:schemeClr val="tx1"/>
                 </a:solidFill>
@@ -687,7 +703,7 @@
               </a14:hiddenLine>
             </a:ext>
             <a:ext uri="{AF507438-7753-43E0-B8FC-AC1667EBCBE1}">
-              <a14:hiddenEffects xmlns:a14="http://schemas.microsoft.com/office/drawing/2010/main" xmlns="">
+              <a14:hiddenEffects xmlns:a14="http://schemas.microsoft.com/office/drawing/2010/main">
                 <a:effectLst>
                   <a:outerShdw dist="35921" dir="2700000" algn="ctr" rotWithShape="0">
                     <a:schemeClr val="bg2"/>
@@ -1122,7 +1138,7 @@
     </p:spTree>
     <p:extLst>
       <p:ext uri="{BB962C8B-B14F-4D97-AF65-F5344CB8AC3E}">
-        <p14:creationId xmlns:p14="http://schemas.microsoft.com/office/powerpoint/2010/main" xmlns="" val="3807054489"/>
+        <p14:creationId xmlns:p14="http://schemas.microsoft.com/office/powerpoint/2010/main" val="3807054489"/>
       </p:ext>
     </p:extLst>
   </p:cSld>
@@ -1219,7 +1235,7 @@
     </p:spTree>
     <p:extLst>
       <p:ext uri="{BB962C8B-B14F-4D97-AF65-F5344CB8AC3E}">
-        <p14:creationId xmlns:p14="http://schemas.microsoft.com/office/powerpoint/2010/main" xmlns="" val="3750830665"/>
+        <p14:creationId xmlns:p14="http://schemas.microsoft.com/office/powerpoint/2010/main" val="3750830665"/>
       </p:ext>
     </p:extLst>
   </p:cSld>
@@ -1316,7 +1332,7 @@
     </p:spTree>
     <p:extLst>
       <p:ext uri="{BB962C8B-B14F-4D97-AF65-F5344CB8AC3E}">
-        <p14:creationId xmlns:p14="http://schemas.microsoft.com/office/powerpoint/2010/main" xmlns="" val="4179949900"/>
+        <p14:creationId xmlns:p14="http://schemas.microsoft.com/office/powerpoint/2010/main" val="4179949900"/>
       </p:ext>
     </p:extLst>
   </p:cSld>
@@ -1413,7 +1429,7 @@
     </p:spTree>
     <p:extLst>
       <p:ext uri="{BB962C8B-B14F-4D97-AF65-F5344CB8AC3E}">
-        <p14:creationId xmlns:p14="http://schemas.microsoft.com/office/powerpoint/2010/main" xmlns="" val="278944399"/>
+        <p14:creationId xmlns:p14="http://schemas.microsoft.com/office/powerpoint/2010/main" val="278944399"/>
       </p:ext>
     </p:extLst>
   </p:cSld>
@@ -1510,7 +1526,7 @@
     </p:spTree>
     <p:extLst>
       <p:ext uri="{BB962C8B-B14F-4D97-AF65-F5344CB8AC3E}">
-        <p14:creationId xmlns:p14="http://schemas.microsoft.com/office/powerpoint/2010/main" xmlns="" val="340292597"/>
+        <p14:creationId xmlns:p14="http://schemas.microsoft.com/office/powerpoint/2010/main" val="340292597"/>
       </p:ext>
     </p:extLst>
   </p:cSld>
@@ -1699,7 +1715,7 @@
     </p:spTree>
     <p:extLst>
       <p:ext uri="{BB962C8B-B14F-4D97-AF65-F5344CB8AC3E}">
-        <p14:creationId xmlns:p14="http://schemas.microsoft.com/office/powerpoint/2010/main" xmlns="" val="293590396"/>
+        <p14:creationId xmlns:p14="http://schemas.microsoft.com/office/powerpoint/2010/main" val="293590396"/>
       </p:ext>
     </p:extLst>
   </p:cSld>
@@ -1788,7 +1804,7 @@
           </a:xfrm>
           <a:extLst>
             <a:ext uri="{AF507438-7753-43E0-B8FC-AC1667EBCBE1}">
-              <a14:hiddenEffects xmlns:a14="http://schemas.microsoft.com/office/drawing/2010/main" xmlns="">
+              <a14:hiddenEffects xmlns:a14="http://schemas.microsoft.com/office/drawing/2010/main">
                 <a:effectLst>
                   <a:outerShdw dist="17961" dir="2700000" algn="ctr" rotWithShape="0">
                     <a:schemeClr val="bg2"/>
@@ -3894,7 +3910,7 @@
           </a:xfrm>
           <a:extLst>
             <a:ext uri="{AF507438-7753-43E0-B8FC-AC1667EBCBE1}">
-              <a14:hiddenEffects xmlns:a14="http://schemas.microsoft.com/office/drawing/2010/main" xmlns="">
+              <a14:hiddenEffects xmlns:a14="http://schemas.microsoft.com/office/drawing/2010/main">
                 <a:effectLst>
                   <a:outerShdw dist="17961" dir="2700000" algn="ctr" rotWithShape="0">
                     <a:schemeClr val="bg2"/>
@@ -4382,7 +4398,7 @@
     </p:spTree>
     <p:extLst>
       <p:ext uri="{BB962C8B-B14F-4D97-AF65-F5344CB8AC3E}">
-        <p14:creationId xmlns:p14="http://schemas.microsoft.com/office/powerpoint/2010/main" xmlns="" val="3594642026"/>
+        <p14:creationId xmlns:p14="http://schemas.microsoft.com/office/powerpoint/2010/main" val="3594642026"/>
       </p:ext>
     </p:extLst>
   </p:cSld>
@@ -4489,26 +4505,10 @@
                 <a:ea typeface="굴림" charset="-127"/>
                 <a:cs typeface="Calibri" panose="020F0502020204030204" pitchFamily="34" charset="0"/>
               </a:rPr>
-              <a:t>Um estudo informa que os servidores de um Data Center gastam, em média, 850 watts por hora. </a:t>
-            </a:r>
-            <a:r>
-              <a:rPr lang="pt-BR" altLang="ko-KR" sz="2000" dirty="0" smtClean="0">
-                <a:latin typeface="Calibri" panose="020F0502020204030204" pitchFamily="34" charset="0"/>
-                <a:ea typeface="굴림" charset="-127"/>
-                <a:cs typeface="Calibri" panose="020F0502020204030204" pitchFamily="34" charset="0"/>
-              </a:rPr>
-              <a:t>Multiplicado </a:t>
-            </a:r>
-            <a:r>
-              <a:rPr lang="pt-BR" altLang="ko-KR" sz="2000" dirty="0" smtClean="0">
-                <a:latin typeface="Calibri" panose="020F0502020204030204" pitchFamily="34" charset="0"/>
-                <a:ea typeface="굴림" charset="-127"/>
-                <a:cs typeface="Calibri" panose="020F0502020204030204" pitchFamily="34" charset="0"/>
-              </a:rPr>
-              <a:t>por 24 equivale a 20.400 watts diários, ou 20.4 </a:t>
-            </a:r>
-            <a:r>
-              <a:rPr lang="pt-BR" altLang="ko-KR" sz="2000" dirty="0" err="1" smtClean="0">
+              <a:t>Um estudo informa que os servidores de um Data Center gastam, em média, 850 watts por hora. Multiplicado por 24 equivale a 20.400 watts diários, ou 20.4 </a:t>
+            </a:r>
+            <a:r>
+              <a:rPr lang="pt-BR" altLang="ko-KR" sz="2000" dirty="0" err="1">
                 <a:latin typeface="Calibri" panose="020F0502020204030204" pitchFamily="34" charset="0"/>
                 <a:ea typeface="굴림" charset="-127"/>
                 <a:cs typeface="Calibri" panose="020F0502020204030204" pitchFamily="34" charset="0"/>
@@ -4516,7 +4516,7 @@
               <a:t>kilowatts</a:t>
             </a:r>
             <a:r>
-              <a:rPr lang="pt-BR" altLang="ko-KR" sz="2000" dirty="0" smtClean="0">
+              <a:rPr lang="pt-BR" altLang="ko-KR" sz="2000" dirty="0">
                 <a:latin typeface="Calibri" panose="020F0502020204030204" pitchFamily="34" charset="0"/>
                 <a:ea typeface="굴림" charset="-127"/>
                 <a:cs typeface="Calibri" panose="020F0502020204030204" pitchFamily="34" charset="0"/>
@@ -4524,7 +4524,7 @@
               <a:t> (kWh). Multiplique isso por 30 dias para chegar a 612 kWh mensais. Sabendo-se que um </a:t>
             </a:r>
             <a:r>
-              <a:rPr lang="pt-BR" altLang="ko-KR" sz="2000" dirty="0" err="1" smtClean="0">
+              <a:rPr lang="pt-BR" altLang="ko-KR" sz="2000" dirty="0" err="1">
                 <a:latin typeface="Calibri" panose="020F0502020204030204" pitchFamily="34" charset="0"/>
                 <a:ea typeface="굴림" charset="-127"/>
                 <a:cs typeface="Calibri" panose="020F0502020204030204" pitchFamily="34" charset="0"/>
@@ -4532,20 +4532,12 @@
               <a:t>kwh</a:t>
             </a:r>
             <a:r>
-              <a:rPr lang="pt-BR" altLang="ko-KR" sz="2000" dirty="0" smtClean="0">
+              <a:rPr lang="pt-BR" altLang="ko-KR" sz="2000" dirty="0">
                 <a:latin typeface="Calibri" panose="020F0502020204030204" pitchFamily="34" charset="0"/>
                 <a:ea typeface="굴림" charset="-127"/>
                 <a:cs typeface="Calibri" panose="020F0502020204030204" pitchFamily="34" charset="0"/>
               </a:rPr>
-              <a:t>  é igual a R$ 0,80 em tarifa comercial na região de São Paulo o valor de uma conta seria de R$ 489,60</a:t>
-            </a:r>
-            <a:r>
-              <a:rPr lang="pt-BR" altLang="ko-KR" sz="2000" dirty="0" smtClean="0">
-                <a:latin typeface="Calibri" panose="020F0502020204030204" pitchFamily="34" charset="0"/>
-                <a:ea typeface="굴림" charset="-127"/>
-                <a:cs typeface="Calibri" panose="020F0502020204030204" pitchFamily="34" charset="0"/>
-              </a:rPr>
-              <a:t>.</a:t>
+              <a:t>  é igual a R$ 0,80 em tarifa comercial na região de São Paulo o valor de uma conta seria de R$ 489,60.</a:t>
             </a:r>
           </a:p>
           <a:p>
@@ -4555,7 +4547,7 @@
               </a:lnSpc>
               <a:defRPr/>
             </a:pPr>
-            <a:endParaRPr lang="pt-BR" altLang="ko-KR" sz="2000" dirty="0" smtClean="0">
+            <a:endParaRPr lang="pt-BR" altLang="ko-KR" sz="2000" dirty="0">
               <a:latin typeface="Calibri" panose="020F0502020204030204" pitchFamily="34" charset="0"/>
               <a:ea typeface="굴림" charset="-127"/>
               <a:cs typeface="Calibri" panose="020F0502020204030204" pitchFamily="34" charset="0"/>
@@ -4569,23 +4561,15 @@
               <a:defRPr/>
             </a:pPr>
             <a:r>
-              <a:rPr lang="pt-BR" altLang="ko-KR" sz="2000" dirty="0" smtClean="0">
+              <a:rPr lang="pt-BR" altLang="ko-KR" sz="2000" dirty="0">
                 <a:latin typeface="Calibri" panose="020F0502020204030204" pitchFamily="34" charset="0"/>
                 <a:ea typeface="굴림" charset="-127"/>
                 <a:cs typeface="Calibri" panose="020F0502020204030204" pitchFamily="34" charset="0"/>
               </a:rPr>
-              <a:t> </a:t>
-            </a:r>
-            <a:r>
-              <a:rPr lang="pt-BR" altLang="ko-KR" sz="2000" dirty="0" smtClean="0">
-                <a:latin typeface="Calibri" panose="020F0502020204030204" pitchFamily="34" charset="0"/>
-                <a:ea typeface="굴림" charset="-127"/>
-                <a:cs typeface="Calibri" panose="020F0502020204030204" pitchFamily="34" charset="0"/>
-              </a:rPr>
-              <a:t>Um aparelho de ar condicionado com uma potência de 1.580 Watts hora (a potência média de referência) multiplicado por 24 equivale a 37.920 watts diários, ou 37.9 </a:t>
-            </a:r>
-            <a:r>
-              <a:rPr lang="pt-BR" altLang="ko-KR" sz="2000" dirty="0" err="1" smtClean="0">
+              <a:t> Um aparelho de ar condicionado com uma potência de 1.580 Watts hora (a potência média de referência) multiplicado por 24 equivale a 37.920 watts diários, ou 37.9 </a:t>
+            </a:r>
+            <a:r>
+              <a:rPr lang="pt-BR" altLang="ko-KR" sz="2000" dirty="0" err="1">
                 <a:latin typeface="Calibri" panose="020F0502020204030204" pitchFamily="34" charset="0"/>
                 <a:ea typeface="굴림" charset="-127"/>
                 <a:cs typeface="Calibri" panose="020F0502020204030204" pitchFamily="34" charset="0"/>
@@ -4593,18 +4577,13 @@
               <a:t>kilowatts</a:t>
             </a:r>
             <a:r>
-              <a:rPr lang="pt-BR" altLang="ko-KR" sz="2000" dirty="0" smtClean="0">
+              <a:rPr lang="pt-BR" altLang="ko-KR" sz="2000" dirty="0">
                 <a:latin typeface="Calibri" panose="020F0502020204030204" pitchFamily="34" charset="0"/>
                 <a:ea typeface="굴림" charset="-127"/>
                 <a:cs typeface="Calibri" panose="020F0502020204030204" pitchFamily="34" charset="0"/>
               </a:rPr>
               <a:t> (kWh). Multiplique isso por 30 dias para chegar a 1137 kWh mensais o total seria de R$ 909,60 por mês. </a:t>
             </a:r>
-            <a:endParaRPr lang="pt-BR" altLang="ko-KR" sz="2000" dirty="0" smtClean="0">
-              <a:latin typeface="Calibri" panose="020F0502020204030204" pitchFamily="34" charset="0"/>
-              <a:ea typeface="굴림" charset="-127"/>
-              <a:cs typeface="Calibri" panose="020F0502020204030204" pitchFamily="34" charset="0"/>
-            </a:endParaRPr>
           </a:p>
           <a:p>
             <a:pPr eaLnBrk="1" hangingPunct="1">
@@ -4613,7 +4592,7 @@
               </a:lnSpc>
               <a:defRPr/>
             </a:pPr>
-            <a:endParaRPr lang="pt-BR" altLang="ko-KR" sz="2000" smtClean="0">
+            <a:endParaRPr lang="pt-BR" altLang="ko-KR" sz="2000">
               <a:latin typeface="Calibri" panose="020F0502020204030204" pitchFamily="34" charset="0"/>
               <a:ea typeface="굴림" charset="-127"/>
               <a:cs typeface="Calibri" panose="020F0502020204030204" pitchFamily="34" charset="0"/>
@@ -4627,7 +4606,7 @@
               <a:defRPr/>
             </a:pPr>
             <a:r>
-              <a:rPr lang="pt-BR" altLang="ko-KR" sz="2000" smtClean="0">
+              <a:rPr lang="pt-BR" altLang="ko-KR" sz="2000">
                 <a:latin typeface="Calibri" panose="020F0502020204030204" pitchFamily="34" charset="0"/>
                 <a:ea typeface="굴림" charset="-127"/>
                 <a:cs typeface="Calibri" panose="020F0502020204030204" pitchFamily="34" charset="0"/>
@@ -4635,25 +4614,20 @@
               <a:t>Então </a:t>
             </a:r>
             <a:r>
-              <a:rPr lang="pt-BR" altLang="ko-KR" sz="2000" dirty="0" smtClean="0">
+              <a:rPr lang="pt-BR" altLang="ko-KR" sz="2000" dirty="0">
                 <a:latin typeface="Calibri" panose="020F0502020204030204" pitchFamily="34" charset="0"/>
                 <a:ea typeface="굴림" charset="-127"/>
                 <a:cs typeface="Calibri" panose="020F0502020204030204" pitchFamily="34" charset="0"/>
               </a:rPr>
               <a:t>ao todo apenas na região onde está o data Center (considerando apenas o data Center e o ar condicionado) seria um total de aproximadamente R$ 1400,00.</a:t>
             </a:r>
-            <a:endParaRPr lang="pt-BR" altLang="ko-KR" sz="2000" dirty="0">
-              <a:latin typeface="Calibri" panose="020F0502020204030204" pitchFamily="34" charset="0"/>
-              <a:ea typeface="굴림" charset="-127"/>
-              <a:cs typeface="Calibri" panose="020F0502020204030204" pitchFamily="34" charset="0"/>
-            </a:endParaRPr>
           </a:p>
         </p:txBody>
       </p:sp>
     </p:spTree>
     <p:extLst>
       <p:ext uri="{BB962C8B-B14F-4D97-AF65-F5344CB8AC3E}">
-        <p14:creationId xmlns:p14="http://schemas.microsoft.com/office/powerpoint/2010/main" xmlns="" val="2693028972"/>
+        <p14:creationId xmlns:p14="http://schemas.microsoft.com/office/powerpoint/2010/main" val="2693028972"/>
       </p:ext>
     </p:extLst>
   </p:cSld>
@@ -4761,7 +4735,7 @@
                 <a:ea typeface="Times New Roman" panose="02020603050405020304" pitchFamily="18" charset="0"/>
                 <a:cs typeface="Calibri" panose="020F0502020204030204" pitchFamily="34" charset="0"/>
               </a:rPr>
-              <a:t>Climatizaquadrado</a:t>
+              <a:t>Climatizadores</a:t>
             </a:r>
             <a:r>
               <a:rPr lang="pt-BR" sz="2000" dirty="0">
@@ -4847,16 +4821,16 @@
                 <a:ea typeface="Calibri" panose="020F0502020204030204" pitchFamily="34" charset="0"/>
                 <a:cs typeface="Calibri" panose="020F0502020204030204" pitchFamily="34" charset="0"/>
               </a:rPr>
-              <a:t>acrescentando uma </a:t>
-            </a:r>
-            <a:r>
-              <a:rPr lang="pt-BR" sz="2000" dirty="0" err="1">
+              <a:t>acrescentando </a:t>
+            </a:r>
+            <a:r>
+              <a:rPr lang="pt-BR" sz="2000">
                 <a:effectLst/>
                 <a:latin typeface="Calibri" panose="020F0502020204030204" pitchFamily="34" charset="0"/>
                 <a:ea typeface="Calibri" panose="020F0502020204030204" pitchFamily="34" charset="0"/>
                 <a:cs typeface="Calibri" panose="020F0502020204030204" pitchFamily="34" charset="0"/>
               </a:rPr>
-              <a:t>freqüência</a:t>
+              <a:t>uma frequência </a:t>
             </a:r>
             <a:r>
               <a:rPr lang="pt-BR" sz="2000" dirty="0">
@@ -4865,7 +4839,7 @@
                 <a:ea typeface="Calibri" panose="020F0502020204030204" pitchFamily="34" charset="0"/>
                 <a:cs typeface="Calibri" panose="020F0502020204030204" pitchFamily="34" charset="0"/>
               </a:rPr>
-              <a:t> variável para os mesmos diminuindo sua velocidade e no uso de energia. </a:t>
+              <a:t>variável para os mesmos diminuindo sua velocidade e no uso de energia. </a:t>
             </a:r>
           </a:p>
           <a:p>
@@ -4897,7 +4871,7 @@
     </p:spTree>
     <p:extLst>
       <p:ext uri="{BB962C8B-B14F-4D97-AF65-F5344CB8AC3E}">
-        <p14:creationId xmlns:p14="http://schemas.microsoft.com/office/powerpoint/2010/main" xmlns="" val="2630225589"/>
+        <p14:creationId xmlns:p14="http://schemas.microsoft.com/office/powerpoint/2010/main" val="2630225589"/>
       </p:ext>
     </p:extLst>
   </p:cSld>
@@ -5131,7 +5105,7 @@
     </p:spTree>
     <p:extLst>
       <p:ext uri="{BB962C8B-B14F-4D97-AF65-F5344CB8AC3E}">
-        <p14:creationId xmlns:p14="http://schemas.microsoft.com/office/powerpoint/2010/main" xmlns="" val="3896836353"/>
+        <p14:creationId xmlns:p14="http://schemas.microsoft.com/office/powerpoint/2010/main" val="3896836353"/>
       </p:ext>
     </p:extLst>
   </p:cSld>
@@ -5405,7 +5379,7 @@
     </p:spTree>
     <p:extLst>
       <p:ext uri="{BB962C8B-B14F-4D97-AF65-F5344CB8AC3E}">
-        <p14:creationId xmlns:p14="http://schemas.microsoft.com/office/powerpoint/2010/main" xmlns="" val="3600870286"/>
+        <p14:creationId xmlns:p14="http://schemas.microsoft.com/office/powerpoint/2010/main" val="3600870286"/>
       </p:ext>
     </p:extLst>
   </p:cSld>
@@ -5490,7 +5464,7 @@
           <p:cNvPr id="3" name="Imagem 2" descr="Uma imagem contendo computer, computador, monitor, tela&#10;&#10;Descrição gerada automaticamente">
             <a:extLst>
               <a:ext uri="{FF2B5EF4-FFF2-40B4-BE49-F238E27FC236}">
-                <a16:creationId xmlns:a16="http://schemas.microsoft.com/office/drawing/2014/main" xmlns="" id="{726C0F36-B66E-4B87-8A4F-95563948DACE}"/>
+                <a16:creationId xmlns:a16="http://schemas.microsoft.com/office/drawing/2014/main" id="{726C0F36-B66E-4B87-8A4F-95563948DACE}"/>
               </a:ext>
             </a:extLst>
           </p:cNvPr>
@@ -5503,7 +5477,7 @@
           <a:blip r:embed="rId4">
             <a:extLst>
               <a:ext uri="{28A0092B-C50C-407E-A947-70E740481C1C}">
-                <a14:useLocalDpi xmlns:a14="http://schemas.microsoft.com/office/drawing/2010/main" xmlns="" val="0"/>
+                <a14:useLocalDpi xmlns:a14="http://schemas.microsoft.com/office/drawing/2010/main" val="0"/>
               </a:ext>
             </a:extLst>
           </a:blip>
@@ -5694,7 +5668,7 @@
     </p:spTree>
     <p:extLst>
       <p:ext uri="{BB962C8B-B14F-4D97-AF65-F5344CB8AC3E}">
-        <p14:creationId xmlns:p14="http://schemas.microsoft.com/office/powerpoint/2010/main" xmlns="" val="654823255"/>
+        <p14:creationId xmlns:p14="http://schemas.microsoft.com/office/powerpoint/2010/main" val="654823255"/>
       </p:ext>
     </p:extLst>
   </p:cSld>
@@ -6380,7 +6354,7 @@
   </a:extraClrSchemeLst>
   <a:extLst>
     <a:ext uri="{05A4C25C-085E-4340-85A3-A5531E510DB2}">
-      <thm15:themeFamily xmlns:thm15="http://schemas.microsoft.com/office/thememl/2012/main" xmlns="" name="template.potx" id="{9AD1E770-F34A-4B83-98BE-BCB4E1CA2A38}" vid="{F423FF84-1499-40C4-95D0-00FFD65AB022}"/>
+      <thm15:themeFamily xmlns:thm15="http://schemas.microsoft.com/office/thememl/2012/main" name="template.potx" id="{9AD1E770-F34A-4B83-98BE-BCB4E1CA2A38}" vid="{F423FF84-1499-40C4-95D0-00FFD65AB022}"/>
     </a:ext>
   </a:extLst>
 </a:theme>

</xml_diff>